<commit_message>
update 27thHW and 29th
</commit_message>
<xml_diff>
--- a/R/スライド/第27回.pptx
+++ b/R/スライド/第27回.pptx
@@ -5,7 +5,7 @@
     <p:sldMasterId id="2147483648" r:id="rId1"/>
   </p:sldMasterIdLst>
   <p:notesMasterIdLst>
-    <p:notesMasterId r:id="rId13"/>
+    <p:notesMasterId r:id="rId12"/>
   </p:notesMasterIdLst>
   <p:sldIdLst>
     <p:sldId id="257" r:id="rId2"/>
@@ -18,7 +18,6 @@
     <p:sldId id="291" r:id="rId9"/>
     <p:sldId id="293" r:id="rId10"/>
     <p:sldId id="294" r:id="rId11"/>
-    <p:sldId id="297" r:id="rId12"/>
   </p:sldIdLst>
   <p:sldSz cx="12192000" cy="6858000"/>
   <p:notesSz cx="6858000" cy="9144000"/>
@@ -542,7 +541,7 @@
           <a:p>
             <a:fld id="{56F9D65D-073B-7846-A770-D643C4EB6194}" type="datetimeFigureOut">
               <a:rPr kumimoji="1" lang="ja-JP" altLang="en-US" smtClean="0"/>
-              <a:t>2022/11/14</a:t>
+              <a:t>2022/11/23</a:t>
             </a:fld>
             <a:endParaRPr kumimoji="1" lang="ja-JP" altLang="en-US"/>
           </a:p>
@@ -1240,7 +1239,7 @@
           <a:p>
             <a:fld id="{E4245ECD-3E8A-534F-BCF2-3F40B55B6962}" type="datetimeFigureOut">
               <a:rPr kumimoji="1" lang="ja-JP" altLang="en-US" smtClean="0"/>
-              <a:t>2022/11/14</a:t>
+              <a:t>2022/11/23</a:t>
             </a:fld>
             <a:endParaRPr kumimoji="1" lang="ja-JP" altLang="en-US"/>
           </a:p>
@@ -1470,7 +1469,7 @@
           <a:p>
             <a:fld id="{E4245ECD-3E8A-534F-BCF2-3F40B55B6962}" type="datetimeFigureOut">
               <a:rPr kumimoji="1" lang="ja-JP" altLang="en-US" smtClean="0"/>
-              <a:t>2022/11/14</a:t>
+              <a:t>2022/11/23</a:t>
             </a:fld>
             <a:endParaRPr kumimoji="1" lang="ja-JP" altLang="en-US"/>
           </a:p>
@@ -1710,7 +1709,7 @@
           <a:p>
             <a:fld id="{E4245ECD-3E8A-534F-BCF2-3F40B55B6962}" type="datetimeFigureOut">
               <a:rPr kumimoji="1" lang="ja-JP" altLang="en-US" smtClean="0"/>
-              <a:t>2022/11/14</a:t>
+              <a:t>2022/11/23</a:t>
             </a:fld>
             <a:endParaRPr kumimoji="1" lang="ja-JP" altLang="en-US"/>
           </a:p>
@@ -1940,7 +1939,7 @@
           <a:p>
             <a:fld id="{E4245ECD-3E8A-534F-BCF2-3F40B55B6962}" type="datetimeFigureOut">
               <a:rPr kumimoji="1" lang="ja-JP" altLang="en-US" smtClean="0"/>
-              <a:t>2022/11/14</a:t>
+              <a:t>2022/11/23</a:t>
             </a:fld>
             <a:endParaRPr kumimoji="1" lang="ja-JP" altLang="en-US"/>
           </a:p>
@@ -2215,7 +2214,7 @@
           <a:p>
             <a:fld id="{E4245ECD-3E8A-534F-BCF2-3F40B55B6962}" type="datetimeFigureOut">
               <a:rPr kumimoji="1" lang="ja-JP" altLang="en-US" smtClean="0"/>
-              <a:t>2022/11/14</a:t>
+              <a:t>2022/11/23</a:t>
             </a:fld>
             <a:endParaRPr kumimoji="1" lang="ja-JP" altLang="en-US"/>
           </a:p>
@@ -2544,7 +2543,7 @@
           <a:p>
             <a:fld id="{E4245ECD-3E8A-534F-BCF2-3F40B55B6962}" type="datetimeFigureOut">
               <a:rPr kumimoji="1" lang="ja-JP" altLang="en-US" smtClean="0"/>
-              <a:t>2022/11/14</a:t>
+              <a:t>2022/11/23</a:t>
             </a:fld>
             <a:endParaRPr kumimoji="1" lang="ja-JP" altLang="en-US"/>
           </a:p>
@@ -3020,7 +3019,7 @@
           <a:p>
             <a:fld id="{E4245ECD-3E8A-534F-BCF2-3F40B55B6962}" type="datetimeFigureOut">
               <a:rPr kumimoji="1" lang="ja-JP" altLang="en-US" smtClean="0"/>
-              <a:t>2022/11/14</a:t>
+              <a:t>2022/11/23</a:t>
             </a:fld>
             <a:endParaRPr kumimoji="1" lang="ja-JP" altLang="en-US"/>
           </a:p>
@@ -3161,7 +3160,7 @@
           <a:p>
             <a:fld id="{E4245ECD-3E8A-534F-BCF2-3F40B55B6962}" type="datetimeFigureOut">
               <a:rPr kumimoji="1" lang="ja-JP" altLang="en-US" smtClean="0"/>
-              <a:t>2022/11/14</a:t>
+              <a:t>2022/11/23</a:t>
             </a:fld>
             <a:endParaRPr kumimoji="1" lang="ja-JP" altLang="en-US"/>
           </a:p>
@@ -3274,7 +3273,7 @@
           <a:p>
             <a:fld id="{E4245ECD-3E8A-534F-BCF2-3F40B55B6962}" type="datetimeFigureOut">
               <a:rPr kumimoji="1" lang="ja-JP" altLang="en-US" smtClean="0"/>
-              <a:t>2022/11/14</a:t>
+              <a:t>2022/11/23</a:t>
             </a:fld>
             <a:endParaRPr kumimoji="1" lang="ja-JP" altLang="en-US"/>
           </a:p>
@@ -3617,7 +3616,7 @@
           <a:p>
             <a:fld id="{E4245ECD-3E8A-534F-BCF2-3F40B55B6962}" type="datetimeFigureOut">
               <a:rPr kumimoji="1" lang="ja-JP" altLang="en-US" smtClean="0"/>
-              <a:t>2022/11/14</a:t>
+              <a:t>2022/11/23</a:t>
             </a:fld>
             <a:endParaRPr kumimoji="1" lang="ja-JP" altLang="en-US"/>
           </a:p>
@@ -3905,7 +3904,7 @@
           <a:p>
             <a:fld id="{E4245ECD-3E8A-534F-BCF2-3F40B55B6962}" type="datetimeFigureOut">
               <a:rPr kumimoji="1" lang="ja-JP" altLang="en-US" smtClean="0"/>
-              <a:t>2022/11/14</a:t>
+              <a:t>2022/11/23</a:t>
             </a:fld>
             <a:endParaRPr kumimoji="1" lang="ja-JP" altLang="en-US"/>
           </a:p>
@@ -4178,7 +4177,7 @@
           <a:p>
             <a:fld id="{E4245ECD-3E8A-534F-BCF2-3F40B55B6962}" type="datetimeFigureOut">
               <a:rPr kumimoji="1" lang="ja-JP" altLang="en-US" smtClean="0"/>
-              <a:t>2022/11/14</a:t>
+              <a:t>2022/11/23</a:t>
             </a:fld>
             <a:endParaRPr kumimoji="1" lang="ja-JP" altLang="en-US"/>
           </a:p>
@@ -4844,262 +4843,6 @@
     <p:extLst>
       <p:ext uri="{BB962C8B-B14F-4D97-AF65-F5344CB8AC3E}">
         <p14:creationId xmlns:p14="http://schemas.microsoft.com/office/powerpoint/2010/main" val="487569456"/>
-      </p:ext>
-    </p:extLst>
-  </p:cSld>
-  <p:clrMapOvr>
-    <a:masterClrMapping/>
-  </p:clrMapOvr>
-</p:sld>
-</file>
-
-<file path=ppt/slides/slide11.xml><?xml version="1.0" encoding="utf-8"?>
-<p:sld xmlns:a="http://schemas.openxmlformats.org/drawingml/2006/main" xmlns:r="http://schemas.openxmlformats.org/officeDocument/2006/relationships" xmlns:p="http://schemas.openxmlformats.org/presentationml/2006/main">
-  <p:cSld>
-    <p:spTree>
-      <p:nvGrpSpPr>
-        <p:cNvPr id="1" name=""/>
-        <p:cNvGrpSpPr/>
-        <p:nvPr/>
-      </p:nvGrpSpPr>
-      <p:grpSpPr>
-        <a:xfrm>
-          <a:off x="0" y="0"/>
-          <a:ext cx="0" cy="0"/>
-          <a:chOff x="0" y="0"/>
-          <a:chExt cx="0" cy="0"/>
-        </a:xfrm>
-      </p:grpSpPr>
-      <p:sp>
-        <p:nvSpPr>
-          <p:cNvPr id="2" name="タイトル 1">
-            <a:extLst>
-              <a:ext uri="{FF2B5EF4-FFF2-40B4-BE49-F238E27FC236}">
-                <a16:creationId xmlns:a16="http://schemas.microsoft.com/office/drawing/2014/main" id="{623612D0-D76F-C74E-891A-707A6005D165}"/>
-              </a:ext>
-            </a:extLst>
-          </p:cNvPr>
-          <p:cNvSpPr>
-            <a:spLocks noGrp="1"/>
-          </p:cNvSpPr>
-          <p:nvPr>
-            <p:ph type="title"/>
-          </p:nvPr>
-        </p:nvSpPr>
-        <p:spPr/>
-        <p:txBody>
-          <a:bodyPr/>
-          <a:lstStyle/>
-          <a:p>
-            <a:r>
-              <a:rPr lang="ja-JP" altLang="en-US"/>
-              <a:t>やってみよう！</a:t>
-            </a:r>
-            <a:endParaRPr lang="en-US" altLang="ja-JP" dirty="0"/>
-          </a:p>
-        </p:txBody>
-      </p:sp>
-      <p:sp>
-        <p:nvSpPr>
-          <p:cNvPr id="3" name="コンテンツ プレースホルダー 2">
-            <a:extLst>
-              <a:ext uri="{FF2B5EF4-FFF2-40B4-BE49-F238E27FC236}">
-                <a16:creationId xmlns:a16="http://schemas.microsoft.com/office/drawing/2014/main" id="{DB2B9403-9C69-B247-888D-FFFF16D2A69C}"/>
-              </a:ext>
-            </a:extLst>
-          </p:cNvPr>
-          <p:cNvSpPr>
-            <a:spLocks noGrp="1"/>
-          </p:cNvSpPr>
-          <p:nvPr>
-            <p:ph idx="1"/>
-          </p:nvPr>
-        </p:nvSpPr>
-        <p:spPr/>
-        <p:txBody>
-          <a:bodyPr>
-            <a:normAutofit fontScale="92500" lnSpcReduction="10000"/>
-          </a:bodyPr>
-          <a:lstStyle/>
-          <a:p>
-            <a:r>
-              <a:rPr lang="ja-JP" altLang="en-US"/>
-              <a:t>第</a:t>
-            </a:r>
-            <a:r>
-              <a:rPr lang="en-US" altLang="ja-JP" dirty="0"/>
-              <a:t>12</a:t>
-            </a:r>
-            <a:r>
-              <a:rPr lang="ja-JP" altLang="en-US"/>
-              <a:t>回で作成した船・温度ごとの漁獲と同様のデータセット</a:t>
-            </a:r>
-            <a:r>
-              <a:rPr lang="en-US" altLang="ja-JP" dirty="0"/>
-              <a:t>catch_data2.csv</a:t>
-            </a:r>
-            <a:r>
-              <a:rPr lang="ja-JP" altLang="en-US"/>
-              <a:t>を読み込んで、</a:t>
-            </a:r>
-            <a:r>
-              <a:rPr lang="en-US" altLang="ja-JP" dirty="0"/>
-              <a:t>GLM</a:t>
-            </a:r>
-            <a:r>
-              <a:rPr lang="ja-JP" altLang="en-US"/>
-              <a:t>実行．</a:t>
-            </a:r>
-            <a:endParaRPr lang="en-US" altLang="ja-JP" dirty="0"/>
-          </a:p>
-          <a:p>
-            <a:pPr lvl="1"/>
-            <a:r>
-              <a:rPr lang="ja-JP" altLang="en-US"/>
-              <a:t>漁獲は量でなく尾数になっているので誤差構造にポアソン分布、リンク関数を</a:t>
-            </a:r>
-            <a:r>
-              <a:rPr lang="en-US" altLang="ja-JP" dirty="0"/>
-              <a:t>log</a:t>
-            </a:r>
-            <a:r>
-              <a:rPr lang="ja-JP" altLang="en-US"/>
-              <a:t>として解析．</a:t>
-            </a:r>
-            <a:endParaRPr lang="en-US" altLang="ja-JP" dirty="0"/>
-          </a:p>
-          <a:p>
-            <a:pPr lvl="1"/>
-            <a:endParaRPr lang="en-US" altLang="ja-JP" dirty="0"/>
-          </a:p>
-          <a:p>
-            <a:r>
-              <a:rPr lang="ja-JP" altLang="en-US"/>
-              <a:t>目的変数を漁獲、説明変数を船・温度・操業場所として</a:t>
-            </a:r>
-            <a:r>
-              <a:rPr lang="en-US" altLang="ja-JP" dirty="0"/>
-              <a:t>GLM</a:t>
-            </a:r>
-            <a:r>
-              <a:rPr lang="ja-JP" altLang="en-US"/>
-              <a:t>実行．</a:t>
-            </a:r>
-            <a:endParaRPr lang="en-US" altLang="ja-JP" dirty="0"/>
-          </a:p>
-          <a:p>
-            <a:pPr lvl="1"/>
-            <a:r>
-              <a:rPr lang="ja-JP" altLang="en-US"/>
-              <a:t>操業場所の推定係数は安定してそうか推定値に対して推定の誤差は大きくないか？大きすぎると統計量</a:t>
-            </a:r>
-            <a:r>
-              <a:rPr lang="en-US" altLang="ja-JP" dirty="0"/>
-              <a:t>z</a:t>
-            </a:r>
-            <a:r>
-              <a:rPr lang="ja-JP" altLang="en-US"/>
-              <a:t>が小さくて有意水準</a:t>
-            </a:r>
-            <a:r>
-              <a:rPr lang="en-US" altLang="ja-JP" dirty="0"/>
-              <a:t>0.05</a:t>
-            </a:r>
-            <a:r>
-              <a:rPr lang="ja-JP" altLang="en-US"/>
-              <a:t>を超えるものも出てくる．あるいはそもそも操業場所ごとのデータ数が少なくないか？</a:t>
-            </a:r>
-            <a:endParaRPr lang="en-US" altLang="ja-JP" dirty="0"/>
-          </a:p>
-          <a:p>
-            <a:pPr lvl="1"/>
-            <a:r>
-              <a:rPr lang="ja-JP" altLang="en-US">
-                <a:solidFill>
-                  <a:srgbClr val="FF0000"/>
-                </a:solidFill>
-              </a:rPr>
-              <a:t>検定統計量</a:t>
-            </a:r>
-            <a:r>
-              <a:rPr lang="en-US" altLang="ja-JP" dirty="0">
-                <a:solidFill>
-                  <a:srgbClr val="FF0000"/>
-                </a:solidFill>
-              </a:rPr>
-              <a:t>z</a:t>
-            </a:r>
-            <a:r>
-              <a:rPr lang="ja-JP" altLang="en-US">
-                <a:solidFill>
-                  <a:srgbClr val="FF0000"/>
-                </a:solidFill>
-              </a:rPr>
-              <a:t>をもちいた</a:t>
-            </a:r>
-            <a:r>
-              <a:rPr lang="en-US" altLang="ja-JP" dirty="0">
-                <a:solidFill>
-                  <a:srgbClr val="FF0000"/>
-                </a:solidFill>
-              </a:rPr>
-              <a:t>Wald</a:t>
-            </a:r>
-            <a:r>
-              <a:rPr lang="ja-JP" altLang="en-US">
-                <a:solidFill>
-                  <a:srgbClr val="FF0000"/>
-                </a:solidFill>
-              </a:rPr>
-              <a:t>検定はサンプルサイズが小さいと推定の標準誤差の信頼性が低くなる</a:t>
-            </a:r>
-            <a:endParaRPr lang="en-US" altLang="ja-JP" dirty="0">
-              <a:solidFill>
-                <a:srgbClr val="FF0000"/>
-              </a:solidFill>
-            </a:endParaRPr>
-          </a:p>
-          <a:p>
-            <a:pPr lvl="1"/>
-            <a:r>
-              <a:rPr lang="ja-JP" altLang="en-US">
-                <a:solidFill>
-                  <a:srgbClr val="FF0000"/>
-                </a:solidFill>
-              </a:rPr>
-              <a:t>カテゴリ変数を含んだ場合、切片となる係数との兼ね合いで</a:t>
-            </a:r>
-            <a:r>
-              <a:rPr lang="en-US" altLang="ja-JP" dirty="0">
-                <a:solidFill>
-                  <a:srgbClr val="FF0000"/>
-                </a:solidFill>
-              </a:rPr>
-              <a:t>p</a:t>
-            </a:r>
-            <a:r>
-              <a:rPr lang="ja-JP" altLang="en-US">
-                <a:solidFill>
-                  <a:srgbClr val="FF0000"/>
-                </a:solidFill>
-              </a:rPr>
-              <a:t>値が左右されることがある</a:t>
-            </a:r>
-            <a:endParaRPr lang="en-US" altLang="ja-JP" dirty="0">
-              <a:solidFill>
-                <a:srgbClr val="FF0000"/>
-              </a:solidFill>
-            </a:endParaRPr>
-          </a:p>
-          <a:p>
-            <a:endParaRPr kumimoji="1" lang="ja-JP" altLang="en-US"/>
-          </a:p>
-        </p:txBody>
-      </p:sp>
-    </p:spTree>
-    <p:extLst>
-      <p:ext uri="{BB962C8B-B14F-4D97-AF65-F5344CB8AC3E}">
-        <p14:creationId xmlns:p14="http://schemas.microsoft.com/office/powerpoint/2010/main" val="524437558"/>
       </p:ext>
     </p:extLst>
   </p:cSld>

</xml_diff>

<commit_message>
update 27th and 29th
</commit_message>
<xml_diff>
--- a/R/スライド/第27回.pptx
+++ b/R/スライド/第27回.pptx
@@ -5,7 +5,7 @@
     <p:sldMasterId id="2147483648" r:id="rId1"/>
   </p:sldMasterIdLst>
   <p:notesMasterIdLst>
-    <p:notesMasterId r:id="rId13"/>
+    <p:notesMasterId r:id="rId12"/>
   </p:notesMasterIdLst>
   <p:sldIdLst>
     <p:sldId id="257" r:id="rId2"/>
@@ -18,7 +18,6 @@
     <p:sldId id="291" r:id="rId9"/>
     <p:sldId id="293" r:id="rId10"/>
     <p:sldId id="294" r:id="rId11"/>
-    <p:sldId id="297" r:id="rId12"/>
   </p:sldIdLst>
   <p:sldSz cx="12192000" cy="6858000"/>
   <p:notesSz cx="6858000" cy="9144000"/>
@@ -542,7 +541,7 @@
           <a:p>
             <a:fld id="{56F9D65D-073B-7846-A770-D643C4EB6194}" type="datetimeFigureOut">
               <a:rPr kumimoji="1" lang="ja-JP" altLang="en-US" smtClean="0"/>
-              <a:t>2022/11/14</a:t>
+              <a:t>2022/11/23</a:t>
             </a:fld>
             <a:endParaRPr kumimoji="1" lang="ja-JP" altLang="en-US"/>
           </a:p>
@@ -1240,7 +1239,7 @@
           <a:p>
             <a:fld id="{E4245ECD-3E8A-534F-BCF2-3F40B55B6962}" type="datetimeFigureOut">
               <a:rPr kumimoji="1" lang="ja-JP" altLang="en-US" smtClean="0"/>
-              <a:t>2022/11/14</a:t>
+              <a:t>2022/11/23</a:t>
             </a:fld>
             <a:endParaRPr kumimoji="1" lang="ja-JP" altLang="en-US"/>
           </a:p>
@@ -1470,7 +1469,7 @@
           <a:p>
             <a:fld id="{E4245ECD-3E8A-534F-BCF2-3F40B55B6962}" type="datetimeFigureOut">
               <a:rPr kumimoji="1" lang="ja-JP" altLang="en-US" smtClean="0"/>
-              <a:t>2022/11/14</a:t>
+              <a:t>2022/11/23</a:t>
             </a:fld>
             <a:endParaRPr kumimoji="1" lang="ja-JP" altLang="en-US"/>
           </a:p>
@@ -1710,7 +1709,7 @@
           <a:p>
             <a:fld id="{E4245ECD-3E8A-534F-BCF2-3F40B55B6962}" type="datetimeFigureOut">
               <a:rPr kumimoji="1" lang="ja-JP" altLang="en-US" smtClean="0"/>
-              <a:t>2022/11/14</a:t>
+              <a:t>2022/11/23</a:t>
             </a:fld>
             <a:endParaRPr kumimoji="1" lang="ja-JP" altLang="en-US"/>
           </a:p>
@@ -1940,7 +1939,7 @@
           <a:p>
             <a:fld id="{E4245ECD-3E8A-534F-BCF2-3F40B55B6962}" type="datetimeFigureOut">
               <a:rPr kumimoji="1" lang="ja-JP" altLang="en-US" smtClean="0"/>
-              <a:t>2022/11/14</a:t>
+              <a:t>2022/11/23</a:t>
             </a:fld>
             <a:endParaRPr kumimoji="1" lang="ja-JP" altLang="en-US"/>
           </a:p>
@@ -2215,7 +2214,7 @@
           <a:p>
             <a:fld id="{E4245ECD-3E8A-534F-BCF2-3F40B55B6962}" type="datetimeFigureOut">
               <a:rPr kumimoji="1" lang="ja-JP" altLang="en-US" smtClean="0"/>
-              <a:t>2022/11/14</a:t>
+              <a:t>2022/11/23</a:t>
             </a:fld>
             <a:endParaRPr kumimoji="1" lang="ja-JP" altLang="en-US"/>
           </a:p>
@@ -2544,7 +2543,7 @@
           <a:p>
             <a:fld id="{E4245ECD-3E8A-534F-BCF2-3F40B55B6962}" type="datetimeFigureOut">
               <a:rPr kumimoji="1" lang="ja-JP" altLang="en-US" smtClean="0"/>
-              <a:t>2022/11/14</a:t>
+              <a:t>2022/11/23</a:t>
             </a:fld>
             <a:endParaRPr kumimoji="1" lang="ja-JP" altLang="en-US"/>
           </a:p>
@@ -3020,7 +3019,7 @@
           <a:p>
             <a:fld id="{E4245ECD-3E8A-534F-BCF2-3F40B55B6962}" type="datetimeFigureOut">
               <a:rPr kumimoji="1" lang="ja-JP" altLang="en-US" smtClean="0"/>
-              <a:t>2022/11/14</a:t>
+              <a:t>2022/11/23</a:t>
             </a:fld>
             <a:endParaRPr kumimoji="1" lang="ja-JP" altLang="en-US"/>
           </a:p>
@@ -3161,7 +3160,7 @@
           <a:p>
             <a:fld id="{E4245ECD-3E8A-534F-BCF2-3F40B55B6962}" type="datetimeFigureOut">
               <a:rPr kumimoji="1" lang="ja-JP" altLang="en-US" smtClean="0"/>
-              <a:t>2022/11/14</a:t>
+              <a:t>2022/11/23</a:t>
             </a:fld>
             <a:endParaRPr kumimoji="1" lang="ja-JP" altLang="en-US"/>
           </a:p>
@@ -3274,7 +3273,7 @@
           <a:p>
             <a:fld id="{E4245ECD-3E8A-534F-BCF2-3F40B55B6962}" type="datetimeFigureOut">
               <a:rPr kumimoji="1" lang="ja-JP" altLang="en-US" smtClean="0"/>
-              <a:t>2022/11/14</a:t>
+              <a:t>2022/11/23</a:t>
             </a:fld>
             <a:endParaRPr kumimoji="1" lang="ja-JP" altLang="en-US"/>
           </a:p>
@@ -3617,7 +3616,7 @@
           <a:p>
             <a:fld id="{E4245ECD-3E8A-534F-BCF2-3F40B55B6962}" type="datetimeFigureOut">
               <a:rPr kumimoji="1" lang="ja-JP" altLang="en-US" smtClean="0"/>
-              <a:t>2022/11/14</a:t>
+              <a:t>2022/11/23</a:t>
             </a:fld>
             <a:endParaRPr kumimoji="1" lang="ja-JP" altLang="en-US"/>
           </a:p>
@@ -3905,7 +3904,7 @@
           <a:p>
             <a:fld id="{E4245ECD-3E8A-534F-BCF2-3F40B55B6962}" type="datetimeFigureOut">
               <a:rPr kumimoji="1" lang="ja-JP" altLang="en-US" smtClean="0"/>
-              <a:t>2022/11/14</a:t>
+              <a:t>2022/11/23</a:t>
             </a:fld>
             <a:endParaRPr kumimoji="1" lang="ja-JP" altLang="en-US"/>
           </a:p>
@@ -4178,7 +4177,7 @@
           <a:p>
             <a:fld id="{E4245ECD-3E8A-534F-BCF2-3F40B55B6962}" type="datetimeFigureOut">
               <a:rPr kumimoji="1" lang="ja-JP" altLang="en-US" smtClean="0"/>
-              <a:t>2022/11/14</a:t>
+              <a:t>2022/11/23</a:t>
             </a:fld>
             <a:endParaRPr kumimoji="1" lang="ja-JP" altLang="en-US"/>
           </a:p>
@@ -4844,262 +4843,6 @@
     <p:extLst>
       <p:ext uri="{BB962C8B-B14F-4D97-AF65-F5344CB8AC3E}">
         <p14:creationId xmlns:p14="http://schemas.microsoft.com/office/powerpoint/2010/main" val="487569456"/>
-      </p:ext>
-    </p:extLst>
-  </p:cSld>
-  <p:clrMapOvr>
-    <a:masterClrMapping/>
-  </p:clrMapOvr>
-</p:sld>
-</file>
-
-<file path=ppt/slides/slide11.xml><?xml version="1.0" encoding="utf-8"?>
-<p:sld xmlns:a="http://schemas.openxmlformats.org/drawingml/2006/main" xmlns:r="http://schemas.openxmlformats.org/officeDocument/2006/relationships" xmlns:p="http://schemas.openxmlformats.org/presentationml/2006/main">
-  <p:cSld>
-    <p:spTree>
-      <p:nvGrpSpPr>
-        <p:cNvPr id="1" name=""/>
-        <p:cNvGrpSpPr/>
-        <p:nvPr/>
-      </p:nvGrpSpPr>
-      <p:grpSpPr>
-        <a:xfrm>
-          <a:off x="0" y="0"/>
-          <a:ext cx="0" cy="0"/>
-          <a:chOff x="0" y="0"/>
-          <a:chExt cx="0" cy="0"/>
-        </a:xfrm>
-      </p:grpSpPr>
-      <p:sp>
-        <p:nvSpPr>
-          <p:cNvPr id="2" name="タイトル 1">
-            <a:extLst>
-              <a:ext uri="{FF2B5EF4-FFF2-40B4-BE49-F238E27FC236}">
-                <a16:creationId xmlns:a16="http://schemas.microsoft.com/office/drawing/2014/main" id="{623612D0-D76F-C74E-891A-707A6005D165}"/>
-              </a:ext>
-            </a:extLst>
-          </p:cNvPr>
-          <p:cNvSpPr>
-            <a:spLocks noGrp="1"/>
-          </p:cNvSpPr>
-          <p:nvPr>
-            <p:ph type="title"/>
-          </p:nvPr>
-        </p:nvSpPr>
-        <p:spPr/>
-        <p:txBody>
-          <a:bodyPr/>
-          <a:lstStyle/>
-          <a:p>
-            <a:r>
-              <a:rPr lang="ja-JP" altLang="en-US"/>
-              <a:t>やってみよう！</a:t>
-            </a:r>
-            <a:endParaRPr lang="en-US" altLang="ja-JP" dirty="0"/>
-          </a:p>
-        </p:txBody>
-      </p:sp>
-      <p:sp>
-        <p:nvSpPr>
-          <p:cNvPr id="3" name="コンテンツ プレースホルダー 2">
-            <a:extLst>
-              <a:ext uri="{FF2B5EF4-FFF2-40B4-BE49-F238E27FC236}">
-                <a16:creationId xmlns:a16="http://schemas.microsoft.com/office/drawing/2014/main" id="{DB2B9403-9C69-B247-888D-FFFF16D2A69C}"/>
-              </a:ext>
-            </a:extLst>
-          </p:cNvPr>
-          <p:cNvSpPr>
-            <a:spLocks noGrp="1"/>
-          </p:cNvSpPr>
-          <p:nvPr>
-            <p:ph idx="1"/>
-          </p:nvPr>
-        </p:nvSpPr>
-        <p:spPr/>
-        <p:txBody>
-          <a:bodyPr>
-            <a:normAutofit fontScale="92500" lnSpcReduction="10000"/>
-          </a:bodyPr>
-          <a:lstStyle/>
-          <a:p>
-            <a:r>
-              <a:rPr lang="ja-JP" altLang="en-US"/>
-              <a:t>第</a:t>
-            </a:r>
-            <a:r>
-              <a:rPr lang="en-US" altLang="ja-JP" dirty="0"/>
-              <a:t>12</a:t>
-            </a:r>
-            <a:r>
-              <a:rPr lang="ja-JP" altLang="en-US"/>
-              <a:t>回で作成した船・温度ごとの漁獲と同様のデータセット</a:t>
-            </a:r>
-            <a:r>
-              <a:rPr lang="en-US" altLang="ja-JP" dirty="0"/>
-              <a:t>catch_data2.csv</a:t>
-            </a:r>
-            <a:r>
-              <a:rPr lang="ja-JP" altLang="en-US"/>
-              <a:t>を読み込んで、</a:t>
-            </a:r>
-            <a:r>
-              <a:rPr lang="en-US" altLang="ja-JP" dirty="0"/>
-              <a:t>GLM</a:t>
-            </a:r>
-            <a:r>
-              <a:rPr lang="ja-JP" altLang="en-US"/>
-              <a:t>実行．</a:t>
-            </a:r>
-            <a:endParaRPr lang="en-US" altLang="ja-JP" dirty="0"/>
-          </a:p>
-          <a:p>
-            <a:pPr lvl="1"/>
-            <a:r>
-              <a:rPr lang="ja-JP" altLang="en-US"/>
-              <a:t>漁獲は量でなく尾数になっているので誤差構造にポアソン分布、リンク関数を</a:t>
-            </a:r>
-            <a:r>
-              <a:rPr lang="en-US" altLang="ja-JP" dirty="0"/>
-              <a:t>log</a:t>
-            </a:r>
-            <a:r>
-              <a:rPr lang="ja-JP" altLang="en-US"/>
-              <a:t>として解析．</a:t>
-            </a:r>
-            <a:endParaRPr lang="en-US" altLang="ja-JP" dirty="0"/>
-          </a:p>
-          <a:p>
-            <a:pPr lvl="1"/>
-            <a:endParaRPr lang="en-US" altLang="ja-JP" dirty="0"/>
-          </a:p>
-          <a:p>
-            <a:r>
-              <a:rPr lang="ja-JP" altLang="en-US"/>
-              <a:t>目的変数を漁獲、説明変数を船・温度・操業場所として</a:t>
-            </a:r>
-            <a:r>
-              <a:rPr lang="en-US" altLang="ja-JP" dirty="0"/>
-              <a:t>GLM</a:t>
-            </a:r>
-            <a:r>
-              <a:rPr lang="ja-JP" altLang="en-US"/>
-              <a:t>実行．</a:t>
-            </a:r>
-            <a:endParaRPr lang="en-US" altLang="ja-JP" dirty="0"/>
-          </a:p>
-          <a:p>
-            <a:pPr lvl="1"/>
-            <a:r>
-              <a:rPr lang="ja-JP" altLang="en-US"/>
-              <a:t>操業場所の推定係数は安定してそうか推定値に対して推定の誤差は大きくないか？大きすぎると統計量</a:t>
-            </a:r>
-            <a:r>
-              <a:rPr lang="en-US" altLang="ja-JP" dirty="0"/>
-              <a:t>z</a:t>
-            </a:r>
-            <a:r>
-              <a:rPr lang="ja-JP" altLang="en-US"/>
-              <a:t>が小さくて有意水準</a:t>
-            </a:r>
-            <a:r>
-              <a:rPr lang="en-US" altLang="ja-JP" dirty="0"/>
-              <a:t>0.05</a:t>
-            </a:r>
-            <a:r>
-              <a:rPr lang="ja-JP" altLang="en-US"/>
-              <a:t>を超えるものも出てくる．あるいはそもそも操業場所ごとのデータ数が少なくないか？</a:t>
-            </a:r>
-            <a:endParaRPr lang="en-US" altLang="ja-JP" dirty="0"/>
-          </a:p>
-          <a:p>
-            <a:pPr lvl="1"/>
-            <a:r>
-              <a:rPr lang="ja-JP" altLang="en-US">
-                <a:solidFill>
-                  <a:srgbClr val="FF0000"/>
-                </a:solidFill>
-              </a:rPr>
-              <a:t>検定統計量</a:t>
-            </a:r>
-            <a:r>
-              <a:rPr lang="en-US" altLang="ja-JP" dirty="0">
-                <a:solidFill>
-                  <a:srgbClr val="FF0000"/>
-                </a:solidFill>
-              </a:rPr>
-              <a:t>z</a:t>
-            </a:r>
-            <a:r>
-              <a:rPr lang="ja-JP" altLang="en-US">
-                <a:solidFill>
-                  <a:srgbClr val="FF0000"/>
-                </a:solidFill>
-              </a:rPr>
-              <a:t>をもちいた</a:t>
-            </a:r>
-            <a:r>
-              <a:rPr lang="en-US" altLang="ja-JP" dirty="0">
-                <a:solidFill>
-                  <a:srgbClr val="FF0000"/>
-                </a:solidFill>
-              </a:rPr>
-              <a:t>Wald</a:t>
-            </a:r>
-            <a:r>
-              <a:rPr lang="ja-JP" altLang="en-US">
-                <a:solidFill>
-                  <a:srgbClr val="FF0000"/>
-                </a:solidFill>
-              </a:rPr>
-              <a:t>検定はサンプルサイズが小さいと推定の標準誤差の信頼性が低くなる</a:t>
-            </a:r>
-            <a:endParaRPr lang="en-US" altLang="ja-JP" dirty="0">
-              <a:solidFill>
-                <a:srgbClr val="FF0000"/>
-              </a:solidFill>
-            </a:endParaRPr>
-          </a:p>
-          <a:p>
-            <a:pPr lvl="1"/>
-            <a:r>
-              <a:rPr lang="ja-JP" altLang="en-US">
-                <a:solidFill>
-                  <a:srgbClr val="FF0000"/>
-                </a:solidFill>
-              </a:rPr>
-              <a:t>カテゴリ変数を含んだ場合、切片となる係数との兼ね合いで</a:t>
-            </a:r>
-            <a:r>
-              <a:rPr lang="en-US" altLang="ja-JP" dirty="0">
-                <a:solidFill>
-                  <a:srgbClr val="FF0000"/>
-                </a:solidFill>
-              </a:rPr>
-              <a:t>p</a:t>
-            </a:r>
-            <a:r>
-              <a:rPr lang="ja-JP" altLang="en-US">
-                <a:solidFill>
-                  <a:srgbClr val="FF0000"/>
-                </a:solidFill>
-              </a:rPr>
-              <a:t>値が左右されることがある</a:t>
-            </a:r>
-            <a:endParaRPr lang="en-US" altLang="ja-JP" dirty="0">
-              <a:solidFill>
-                <a:srgbClr val="FF0000"/>
-              </a:solidFill>
-            </a:endParaRPr>
-          </a:p>
-          <a:p>
-            <a:endParaRPr kumimoji="1" lang="ja-JP" altLang="en-US"/>
-          </a:p>
-        </p:txBody>
-      </p:sp>
-    </p:spTree>
-    <p:extLst>
-      <p:ext uri="{BB962C8B-B14F-4D97-AF65-F5344CB8AC3E}">
-        <p14:creationId xmlns:p14="http://schemas.microsoft.com/office/powerpoint/2010/main" val="524437558"/>
       </p:ext>
     </p:extLst>
   </p:cSld>

</xml_diff>